<commit_message>
Atividade de Lean UX atualizada
</commit_message>
<xml_diff>
--- a/Analise-de-Sistemas/LeanUX-CanvasAdaptado.pptx
+++ b/Analise-de-Sistemas/LeanUX-CanvasAdaptado.pptx
@@ -325,7 +325,7 @@
           <a:p>
             <a:fld id="{C9ECFBEC-A497-481C-BE15-A4AC8555098D}" type="datetimeFigureOut">
               <a:rPr lang="pt-BR" smtClean="0"/>
-              <a:t>19/08/2020</a:t>
+              <a:t>20/08/2020</a:t>
             </a:fld>
             <a:endParaRPr lang="pt-BR"/>
           </a:p>
@@ -616,7 +616,7 @@
           <a:p>
             <a:fld id="{C9ECFBEC-A497-481C-BE15-A4AC8555098D}" type="datetimeFigureOut">
               <a:rPr lang="pt-BR" smtClean="0"/>
-              <a:t>19/08/2020</a:t>
+              <a:t>20/08/2020</a:t>
             </a:fld>
             <a:endParaRPr lang="pt-BR"/>
           </a:p>
@@ -875,7 +875,7 @@
           <a:p>
             <a:fld id="{C9ECFBEC-A497-481C-BE15-A4AC8555098D}" type="datetimeFigureOut">
               <a:rPr lang="pt-BR" smtClean="0"/>
-              <a:t>19/08/2020</a:t>
+              <a:t>20/08/2020</a:t>
             </a:fld>
             <a:endParaRPr lang="pt-BR"/>
           </a:p>
@@ -1344,7 +1344,7 @@
           <a:p>
             <a:fld id="{C9ECFBEC-A497-481C-BE15-A4AC8555098D}" type="datetimeFigureOut">
               <a:rPr lang="pt-BR" smtClean="0"/>
-              <a:t>19/08/2020</a:t>
+              <a:t>20/08/2020</a:t>
             </a:fld>
             <a:endParaRPr lang="pt-BR"/>
           </a:p>
@@ -1524,7 +1524,7 @@
           <a:p>
             <a:fld id="{C9ECFBEC-A497-481C-BE15-A4AC8555098D}" type="datetimeFigureOut">
               <a:rPr lang="pt-BR" smtClean="0"/>
-              <a:t>19/08/2020</a:t>
+              <a:t>20/08/2020</a:t>
             </a:fld>
             <a:endParaRPr lang="pt-BR"/>
           </a:p>
@@ -2100,7 +2100,7 @@
           <a:p>
             <a:fld id="{C9ECFBEC-A497-481C-BE15-A4AC8555098D}" type="datetimeFigureOut">
               <a:rPr lang="pt-BR" smtClean="0"/>
-              <a:t>19/08/2020</a:t>
+              <a:t>20/08/2020</a:t>
             </a:fld>
             <a:endParaRPr lang="pt-BR"/>
           </a:p>
@@ -2432,7 +2432,7 @@
           <a:p>
             <a:fld id="{C9ECFBEC-A497-481C-BE15-A4AC8555098D}" type="datetimeFigureOut">
               <a:rPr lang="pt-BR" smtClean="0"/>
-              <a:t>19/08/2020</a:t>
+              <a:t>20/08/2020</a:t>
             </a:fld>
             <a:endParaRPr lang="pt-BR"/>
           </a:p>
@@ -2607,7 +2607,7 @@
           <a:p>
             <a:fld id="{C9ECFBEC-A497-481C-BE15-A4AC8555098D}" type="datetimeFigureOut">
               <a:rPr lang="pt-BR" smtClean="0"/>
-              <a:t>19/08/2020</a:t>
+              <a:t>20/08/2020</a:t>
             </a:fld>
             <a:endParaRPr lang="pt-BR"/>
           </a:p>
@@ -2787,7 +2787,7 @@
           <a:p>
             <a:fld id="{C9ECFBEC-A497-481C-BE15-A4AC8555098D}" type="datetimeFigureOut">
               <a:rPr lang="pt-BR" smtClean="0"/>
-              <a:t>19/08/2020</a:t>
+              <a:t>20/08/2020</a:t>
             </a:fld>
             <a:endParaRPr lang="pt-BR"/>
           </a:p>
@@ -2957,7 +2957,7 @@
           <a:p>
             <a:fld id="{C9ECFBEC-A497-481C-BE15-A4AC8555098D}" type="datetimeFigureOut">
               <a:rPr lang="pt-BR" smtClean="0"/>
-              <a:t>19/08/2020</a:t>
+              <a:t>20/08/2020</a:t>
             </a:fld>
             <a:endParaRPr lang="pt-BR"/>
           </a:p>
@@ -3214,7 +3214,7 @@
           <a:p>
             <a:fld id="{C9ECFBEC-A497-481C-BE15-A4AC8555098D}" type="datetimeFigureOut">
               <a:rPr lang="pt-BR" smtClean="0"/>
-              <a:t>19/08/2020</a:t>
+              <a:t>20/08/2020</a:t>
             </a:fld>
             <a:endParaRPr lang="pt-BR"/>
           </a:p>
@@ -3506,7 +3506,7 @@
           <a:p>
             <a:fld id="{C9ECFBEC-A497-481C-BE15-A4AC8555098D}" type="datetimeFigureOut">
               <a:rPr lang="pt-BR" smtClean="0"/>
-              <a:t>19/08/2020</a:t>
+              <a:t>20/08/2020</a:t>
             </a:fld>
             <a:endParaRPr lang="pt-BR"/>
           </a:p>
@@ -3936,7 +3936,7 @@
           <a:p>
             <a:fld id="{C9ECFBEC-A497-481C-BE15-A4AC8555098D}" type="datetimeFigureOut">
               <a:rPr lang="pt-BR" smtClean="0"/>
-              <a:t>19/08/2020</a:t>
+              <a:t>20/08/2020</a:t>
             </a:fld>
             <a:endParaRPr lang="pt-BR"/>
           </a:p>
@@ -4054,7 +4054,7 @@
           <a:p>
             <a:fld id="{C9ECFBEC-A497-481C-BE15-A4AC8555098D}" type="datetimeFigureOut">
               <a:rPr lang="pt-BR" smtClean="0"/>
-              <a:t>19/08/2020</a:t>
+              <a:t>20/08/2020</a:t>
             </a:fld>
             <a:endParaRPr lang="pt-BR"/>
           </a:p>
@@ -4149,7 +4149,7 @@
           <a:p>
             <a:fld id="{C9ECFBEC-A497-481C-BE15-A4AC8555098D}" type="datetimeFigureOut">
               <a:rPr lang="pt-BR" smtClean="0"/>
-              <a:t>19/08/2020</a:t>
+              <a:t>20/08/2020</a:t>
             </a:fld>
             <a:endParaRPr lang="pt-BR"/>
           </a:p>
@@ -4432,7 +4432,7 @@
           <a:p>
             <a:fld id="{C9ECFBEC-A497-481C-BE15-A4AC8555098D}" type="datetimeFigureOut">
               <a:rPr lang="pt-BR" smtClean="0"/>
-              <a:t>19/08/2020</a:t>
+              <a:t>20/08/2020</a:t>
             </a:fld>
             <a:endParaRPr lang="pt-BR"/>
           </a:p>
@@ -4723,7 +4723,7 @@
           <a:p>
             <a:fld id="{C9ECFBEC-A497-481C-BE15-A4AC8555098D}" type="datetimeFigureOut">
               <a:rPr lang="pt-BR" smtClean="0"/>
-              <a:t>19/08/2020</a:t>
+              <a:t>20/08/2020</a:t>
             </a:fld>
             <a:endParaRPr lang="pt-BR"/>
           </a:p>
@@ -4954,7 +4954,7 @@
           <a:p>
             <a:fld id="{C9ECFBEC-A497-481C-BE15-A4AC8555098D}" type="datetimeFigureOut">
               <a:rPr lang="pt-BR" smtClean="0"/>
-              <a:t>19/08/2020</a:t>
+              <a:t>20/08/2020</a:t>
             </a:fld>
             <a:endParaRPr lang="pt-BR"/>
           </a:p>
@@ -5999,8 +5999,8 @@
         </p:nvSpPr>
         <p:spPr>
           <a:xfrm>
-            <a:off x="794085" y="2196144"/>
-            <a:ext cx="3128207" cy="276999"/>
+            <a:off x="881402" y="2194520"/>
+            <a:ext cx="2978268" cy="461665"/>
           </a:xfrm>
           <a:prstGeom prst="rect">
             <a:avLst/>
@@ -6020,7 +6020,7 @@
                   <a:schemeClr val="bg1"/>
                 </a:solidFill>
               </a:rPr>
-              <a:t>NECESSIDADES/TAREFAS IDENTIFICADAS</a:t>
+              <a:t>PROBLEMAS/NECESSIDADES/TAREFAS IDENTIFICADAS</a:t>
             </a:r>
           </a:p>
         </p:txBody>
@@ -6159,7 +6159,7 @@
         </p:nvSpPr>
         <p:spPr>
           <a:xfrm>
-            <a:off x="942526" y="2590456"/>
+            <a:off x="943756" y="2673977"/>
             <a:ext cx="1321442" cy="657911"/>
           </a:xfrm>
           <a:prstGeom prst="rect">
@@ -6323,7 +6323,7 @@
                   <a:schemeClr val="bg1"/>
                 </a:solidFill>
               </a:rPr>
-              <a:t>Diminuição de erros</a:t>
+              <a:t>Diminuição de erros / fraudes</a:t>
             </a:r>
           </a:p>
         </p:txBody>
@@ -6403,7 +6403,7 @@
         </p:nvSpPr>
         <p:spPr>
           <a:xfrm>
-            <a:off x="4824670" y="5146475"/>
+            <a:off x="4791357" y="5062025"/>
             <a:ext cx="1321441" cy="657910"/>
           </a:xfrm>
           <a:prstGeom prst="rect">
@@ -6464,7 +6464,7 @@
         </p:nvSpPr>
         <p:spPr>
           <a:xfrm>
-            <a:off x="1705053" y="3373730"/>
+            <a:off x="1709394" y="3417305"/>
             <a:ext cx="1321442" cy="657911"/>
           </a:xfrm>
           <a:prstGeom prst="rect">
@@ -6647,7 +6647,7 @@
         </p:nvSpPr>
         <p:spPr>
           <a:xfrm>
-            <a:off x="6275339" y="4245370"/>
+            <a:off x="6323451" y="4174507"/>
             <a:ext cx="1321442" cy="657911"/>
           </a:xfrm>
           <a:prstGeom prst="rect">
@@ -7038,7 +7038,7 @@
         </p:nvGrpSpPr>
         <p:grpSpPr>
           <a:xfrm>
-            <a:off x="2496579" y="2586159"/>
+            <a:off x="2496514" y="2674645"/>
             <a:ext cx="1321442" cy="656574"/>
             <a:chOff x="2549037" y="2609588"/>
             <a:chExt cx="1321442" cy="656574"/>
@@ -7209,7 +7209,7 @@
                   <a:schemeClr val="bg1"/>
                 </a:solidFill>
               </a:rPr>
-              <a:t>Melhor distribuição dos veículos</a:t>
+              <a:t>Melhor distribuição dos veículos / linhas</a:t>
             </a:r>
           </a:p>
         </p:txBody>
@@ -7246,6 +7246,67 @@
             <a:r>
               <a:rPr lang="pt-BR" sz="1050" b="1" dirty="0"/>
               <a:t>por Jennifer Silva</a:t>
+            </a:r>
+          </a:p>
+        </p:txBody>
+      </p:sp>
+      <p:sp>
+        <p:nvSpPr>
+          <p:cNvPr id="2" name="Retângulo 1">
+            <a:extLst>
+              <a:ext uri="{FF2B5EF4-FFF2-40B4-BE49-F238E27FC236}">
+                <a16:creationId xmlns:a16="http://schemas.microsoft.com/office/drawing/2014/main" id="{392B1623-F6D3-4746-BB3F-B622FFCB1E9F}"/>
+              </a:ext>
+            </a:extLst>
+          </p:cNvPr>
+          <p:cNvSpPr/>
+          <p:nvPr/>
+        </p:nvSpPr>
+        <p:spPr>
+          <a:xfrm>
+            <a:off x="5943164" y="5442200"/>
+            <a:ext cx="1321441" cy="657910"/>
+          </a:xfrm>
+          <a:prstGeom prst="rect">
+            <a:avLst/>
+          </a:prstGeom>
+          <a:ln>
+            <a:noFill/>
+          </a:ln>
+          <a:effectLst>
+            <a:outerShdw blurRad="50800" dist="38100" dir="8100000" algn="tr" rotWithShape="0">
+              <a:prstClr val="black">
+                <a:alpha val="40000"/>
+              </a:prstClr>
+            </a:outerShdw>
+          </a:effectLst>
+        </p:spPr>
+        <p:style>
+          <a:lnRef idx="3">
+            <a:schemeClr val="lt1"/>
+          </a:lnRef>
+          <a:fillRef idx="1">
+            <a:schemeClr val="accent6"/>
+          </a:fillRef>
+          <a:effectRef idx="1">
+            <a:schemeClr val="accent6"/>
+          </a:effectRef>
+          <a:fontRef idx="minor">
+            <a:schemeClr val="lt1"/>
+          </a:fontRef>
+        </p:style>
+        <p:txBody>
+          <a:bodyPr rtlCol="0" anchor="ctr"/>
+          <a:lstStyle/>
+          <a:p>
+            <a:pPr algn="ctr"/>
+            <a:r>
+              <a:rPr lang="pt-BR" sz="1050" dirty="0">
+                <a:solidFill>
+                  <a:schemeClr val="bg1"/>
+                </a:solidFill>
+              </a:rPr>
+              <a:t>API Google Maps</a:t>
             </a:r>
           </a:p>
         </p:txBody>
@@ -7520,6 +7581,21 @@
 </file>
 
 <file path=customXml/item1.xml><?xml version="1.0" encoding="utf-8"?>
+<p:properties xmlns:p="http://schemas.microsoft.com/office/2006/metadata/properties" xmlns:xsi="http://www.w3.org/2001/XMLSchema-instance" xmlns:pc="http://schemas.microsoft.com/office/infopath/2007/PartnerControls">
+  <documentManagement/>
+</p:properties>
+</file>
+
+<file path=customXml/item2.xml><?xml version="1.0" encoding="utf-8"?>
+<?mso-contentType ?>
+<FormTemplates xmlns="http://schemas.microsoft.com/sharepoint/v3/contenttype/forms">
+  <Display>DocumentLibraryForm</Display>
+  <Edit>DocumentLibraryForm</Edit>
+  <New>DocumentLibraryForm</New>
+</FormTemplates>
+</file>
+
+<file path=customXml/item3.xml><?xml version="1.0" encoding="utf-8"?>
 <ct:contentTypeSchema xmlns:ct="http://schemas.microsoft.com/office/2006/metadata/contentType" xmlns:ma="http://schemas.microsoft.com/office/2006/metadata/properties/metaAttributes" ct:_="" ma:_="" ma:contentTypeName="Document" ma:contentTypeID="0x010100E1CAEA25AFF7A84FB9025402B0FBA60B" ma:contentTypeVersion="4" ma:contentTypeDescription="Create a new document." ma:contentTypeScope="" ma:versionID="9e292cb2fba78afd63ff2f0a65e23540">
   <xsd:schema xmlns:xsd="http://www.w3.org/2001/XMLSchema" xmlns:xs="http://www.w3.org/2001/XMLSchema" xmlns:p="http://schemas.microsoft.com/office/2006/metadata/properties" xmlns:ns3="936410bc-0255-41cf-8366-39a573ce95a6" targetNamespace="http://schemas.microsoft.com/office/2006/metadata/properties" ma:root="true" ma:fieldsID="0a5e50527a2d7d8a69e91d62532896d2" ns3:_="">
     <xsd:import namespace="936410bc-0255-41cf-8366-39a573ce95a6"/>
@@ -7665,22 +7741,31 @@
 </ct:contentTypeSchema>
 </file>
 
-<file path=customXml/item2.xml><?xml version="1.0" encoding="utf-8"?>
-<?mso-contentType ?>
-<FormTemplates xmlns="http://schemas.microsoft.com/sharepoint/v3/contenttype/forms">
-  <Display>DocumentLibraryForm</Display>
-  <Edit>DocumentLibraryForm</Edit>
-  <New>DocumentLibraryForm</New>
-</FormTemplates>
+<file path=customXml/itemProps1.xml><?xml version="1.0" encoding="utf-8"?>
+<ds:datastoreItem xmlns:ds="http://schemas.openxmlformats.org/officeDocument/2006/customXml" ds:itemID="{8FA93E2B-A84B-40F0-B21C-2928046AD625}">
+  <ds:schemaRefs>
+    <ds:schemaRef ds:uri="http://schemas.microsoft.com/office/infopath/2007/PartnerControls"/>
+    <ds:schemaRef ds:uri="http://purl.org/dc/elements/1.1/"/>
+    <ds:schemaRef ds:uri="http://schemas.microsoft.com/office/2006/metadata/properties"/>
+    <ds:schemaRef ds:uri="936410bc-0255-41cf-8366-39a573ce95a6"/>
+    <ds:schemaRef ds:uri="http://purl.org/dc/terms/"/>
+    <ds:schemaRef ds:uri="http://schemas.openxmlformats.org/package/2006/metadata/core-properties"/>
+    <ds:schemaRef ds:uri="http://schemas.microsoft.com/office/2006/documentManagement/types"/>
+    <ds:schemaRef ds:uri="http://www.w3.org/XML/1998/namespace"/>
+    <ds:schemaRef ds:uri="http://purl.org/dc/dcmitype/"/>
+  </ds:schemaRefs>
+</ds:datastoreItem>
 </file>
 
-<file path=customXml/item3.xml><?xml version="1.0" encoding="utf-8"?>
-<p:properties xmlns:p="http://schemas.microsoft.com/office/2006/metadata/properties" xmlns:xsi="http://www.w3.org/2001/XMLSchema-instance" xmlns:pc="http://schemas.microsoft.com/office/infopath/2007/PartnerControls">
-  <documentManagement/>
-</p:properties>
+<file path=customXml/itemProps2.xml><?xml version="1.0" encoding="utf-8"?>
+<ds:datastoreItem xmlns:ds="http://schemas.openxmlformats.org/officeDocument/2006/customXml" ds:itemID="{F23D5676-CEED-418A-8A19-0D17D16A1FCD}">
+  <ds:schemaRefs>
+    <ds:schemaRef ds:uri="http://schemas.microsoft.com/sharepoint/v3/contenttype/forms"/>
+  </ds:schemaRefs>
+</ds:datastoreItem>
 </file>
 
-<file path=customXml/itemProps1.xml><?xml version="1.0" encoding="utf-8"?>
+<file path=customXml/itemProps3.xml><?xml version="1.0" encoding="utf-8"?>
 <ds:datastoreItem xmlns:ds="http://schemas.openxmlformats.org/officeDocument/2006/customXml" ds:itemID="{E493E2D5-492D-4AF6-9318-3DC1717C586E}">
   <ds:schemaRefs>
     <ds:schemaRef ds:uri="http://schemas.microsoft.com/office/2006/metadata/contentType"/>
@@ -7696,28 +7781,4 @@
     <ds:schemaRef ds:uri="http://schemas.microsoft.com/internal/obd"/>
   </ds:schemaRefs>
 </ds:datastoreItem>
-</file>
-
-<file path=customXml/itemProps2.xml><?xml version="1.0" encoding="utf-8"?>
-<ds:datastoreItem xmlns:ds="http://schemas.openxmlformats.org/officeDocument/2006/customXml" ds:itemID="{F23D5676-CEED-418A-8A19-0D17D16A1FCD}">
-  <ds:schemaRefs>
-    <ds:schemaRef ds:uri="http://schemas.microsoft.com/sharepoint/v3/contenttype/forms"/>
-  </ds:schemaRefs>
-</ds:datastoreItem>
-</file>
-
-<file path=customXml/itemProps3.xml><?xml version="1.0" encoding="utf-8"?>
-<ds:datastoreItem xmlns:ds="http://schemas.openxmlformats.org/officeDocument/2006/customXml" ds:itemID="{8FA93E2B-A84B-40F0-B21C-2928046AD625}">
-  <ds:schemaRefs>
-    <ds:schemaRef ds:uri="http://schemas.microsoft.com/office/infopath/2007/PartnerControls"/>
-    <ds:schemaRef ds:uri="http://purl.org/dc/elements/1.1/"/>
-    <ds:schemaRef ds:uri="http://schemas.microsoft.com/office/2006/metadata/properties"/>
-    <ds:schemaRef ds:uri="936410bc-0255-41cf-8366-39a573ce95a6"/>
-    <ds:schemaRef ds:uri="http://purl.org/dc/terms/"/>
-    <ds:schemaRef ds:uri="http://schemas.openxmlformats.org/package/2006/metadata/core-properties"/>
-    <ds:schemaRef ds:uri="http://schemas.microsoft.com/office/2006/documentManagement/types"/>
-    <ds:schemaRef ds:uri="http://www.w3.org/XML/1998/namespace"/>
-    <ds:schemaRef ds:uri="http://purl.org/dc/dcmitype/"/>
-  </ds:schemaRefs>
-</ds:datastoreItem>
 </file>
</xml_diff>